<commit_message>
update examples, to make them robust
</commit_message>
<xml_diff>
--- a/week09/Lecture09.pptx
+++ b/week09/Lecture09.pptx
@@ -272,7 +272,7 @@
           <a:p>
             <a:fld id="{634F3F22-B4BB-3F48-9180-464A9F2D66D1}" type="datetimeFigureOut">
               <a:rPr kumimoji="1" lang="zh-CN" altLang="en-US" smtClean="0"/>
-              <a:t>2021/11/7</a:t>
+              <a:t>2024/5/19</a:t>
             </a:fld>
             <a:endParaRPr kumimoji="1" lang="zh-CN" altLang="en-US"/>
           </a:p>
@@ -752,7 +752,7 @@
           <a:p>
             <a:fld id="{FC19A4FA-3D9A-4114-B0D5-759CBD56F1AB}" type="datetimeFigureOut">
               <a:rPr lang="zh-CN" altLang="en-US" smtClean="0"/>
-              <a:t>2021/11/7</a:t>
+              <a:t>2024/5/19</a:t>
             </a:fld>
             <a:endParaRPr lang="zh-CN" altLang="en-US"/>
           </a:p>
@@ -955,7 +955,7 @@
           <a:p>
             <a:fld id="{FC19A4FA-3D9A-4114-B0D5-759CBD56F1AB}" type="datetimeFigureOut">
               <a:rPr lang="zh-CN" altLang="en-US" smtClean="0"/>
-              <a:t>2021/11/7</a:t>
+              <a:t>2024/5/19</a:t>
             </a:fld>
             <a:endParaRPr lang="zh-CN" altLang="en-US"/>
           </a:p>
@@ -1133,7 +1133,7 @@
           <a:p>
             <a:fld id="{FC19A4FA-3D9A-4114-B0D5-759CBD56F1AB}" type="datetimeFigureOut">
               <a:rPr lang="zh-CN" altLang="en-US" smtClean="0"/>
-              <a:t>2021/11/7</a:t>
+              <a:t>2024/5/19</a:t>
             </a:fld>
             <a:endParaRPr lang="zh-CN" altLang="en-US"/>
           </a:p>
@@ -1357,7 +1357,7 @@
           <a:p>
             <a:fld id="{FC19A4FA-3D9A-4114-B0D5-759CBD56F1AB}" type="datetimeFigureOut">
               <a:rPr lang="zh-CN" altLang="en-US" smtClean="0"/>
-              <a:t>2021/11/7</a:t>
+              <a:t>2024/5/19</a:t>
             </a:fld>
             <a:endParaRPr lang="zh-CN" altLang="en-US"/>
           </a:p>
@@ -1591,7 +1591,7 @@
           <a:p>
             <a:fld id="{FC19A4FA-3D9A-4114-B0D5-759CBD56F1AB}" type="datetimeFigureOut">
               <a:rPr lang="zh-CN" altLang="en-US" smtClean="0"/>
-              <a:t>2021/11/7</a:t>
+              <a:t>2024/5/19</a:t>
             </a:fld>
             <a:endParaRPr lang="zh-CN" altLang="en-US"/>
           </a:p>
@@ -1990,7 +1990,7 @@
           <a:p>
             <a:fld id="{FC19A4FA-3D9A-4114-B0D5-759CBD56F1AB}" type="datetimeFigureOut">
               <a:rPr lang="zh-CN" altLang="en-US" smtClean="0"/>
-              <a:t>2021/11/7</a:t>
+              <a:t>2024/5/19</a:t>
             </a:fld>
             <a:endParaRPr lang="zh-CN" altLang="en-US"/>
           </a:p>
@@ -2270,7 +2270,7 @@
           <a:p>
             <a:fld id="{FC19A4FA-3D9A-4114-B0D5-759CBD56F1AB}" type="datetimeFigureOut">
               <a:rPr lang="zh-CN" altLang="en-US" smtClean="0"/>
-              <a:t>2021/11/7</a:t>
+              <a:t>2024/5/19</a:t>
             </a:fld>
             <a:endParaRPr lang="zh-CN" altLang="en-US"/>
           </a:p>
@@ -2422,7 +2422,7 @@
           <a:p>
             <a:fld id="{FC19A4FA-3D9A-4114-B0D5-759CBD56F1AB}" type="datetimeFigureOut">
               <a:rPr lang="zh-CN" altLang="en-US" smtClean="0"/>
-              <a:t>2021/11/7</a:t>
+              <a:t>2024/5/19</a:t>
             </a:fld>
             <a:endParaRPr lang="zh-CN" altLang="en-US"/>
           </a:p>
@@ -2552,7 +2552,7 @@
           <a:p>
             <a:fld id="{FC19A4FA-3D9A-4114-B0D5-759CBD56F1AB}" type="datetimeFigureOut">
               <a:rPr lang="zh-CN" altLang="en-US" smtClean="0"/>
-              <a:t>2021/11/7</a:t>
+              <a:t>2024/5/19</a:t>
             </a:fld>
             <a:endParaRPr lang="zh-CN" altLang="en-US"/>
           </a:p>
@@ -2862,7 +2862,7 @@
           <a:p>
             <a:fld id="{FC19A4FA-3D9A-4114-B0D5-759CBD56F1AB}" type="datetimeFigureOut">
               <a:rPr lang="zh-CN" altLang="en-US" smtClean="0"/>
-              <a:t>2021/11/7</a:t>
+              <a:t>2024/5/19</a:t>
             </a:fld>
             <a:endParaRPr lang="zh-CN" altLang="en-US"/>
           </a:p>
@@ -3149,7 +3149,7 @@
           <a:p>
             <a:fld id="{FC19A4FA-3D9A-4114-B0D5-759CBD56F1AB}" type="datetimeFigureOut">
               <a:rPr lang="zh-CN" altLang="en-US" smtClean="0"/>
-              <a:t>2021/11/7</a:t>
+              <a:t>2024/5/19</a:t>
             </a:fld>
             <a:endParaRPr lang="zh-CN" altLang="en-US"/>
           </a:p>
@@ -3442,7 +3442,7 @@
           <a:p>
             <a:fld id="{FC19A4FA-3D9A-4114-B0D5-759CBD56F1AB}" type="datetimeFigureOut">
               <a:rPr lang="zh-CN" altLang="en-US" smtClean="0"/>
-              <a:t>2021/11/7</a:t>
+              <a:t>2024/5/19</a:t>
             </a:fld>
             <a:endParaRPr lang="zh-CN" altLang="en-US"/>
           </a:p>
@@ -5010,7 +5010,7 @@
                 </a:solidFill>
                 <a:latin typeface="Menlo" panose="020B0609030804020204" pitchFamily="49" charset="0"/>
               </a:rPr>
-              <a:t>true</a:t>
+              <a:t>false</a:t>
             </a:r>
             <a:r>
               <a:rPr lang="en" altLang="zh-CN" dirty="0">
@@ -9711,8 +9711,8 @@
           </a:p>
         </p:txBody>
       </p:sp>
-      <mc:AlternateContent xmlns:mc="http://schemas.openxmlformats.org/markup-compatibility/2006">
-        <mc:Choice xmlns:p14="http://schemas.microsoft.com/office/powerpoint/2010/main" Requires="p14">
+      <mc:AlternateContent xmlns:mc="http://schemas.openxmlformats.org/markup-compatibility/2006" xmlns:p14="http://schemas.microsoft.com/office/powerpoint/2010/main">
+        <mc:Choice Requires="p14">
           <p:contentPart p14:bwMode="auto" r:id="rId2">
             <p14:nvContentPartPr>
               <p14:cNvPr id="5" name="墨迹 4">
@@ -9731,7 +9731,7 @@
             </p14:xfrm>
           </p:contentPart>
         </mc:Choice>
-        <mc:Fallback>
+        <mc:Fallback xmlns="">
           <p:pic>
             <p:nvPicPr>
               <p:cNvPr id="5" name="墨迹 4">
@@ -9762,8 +9762,8 @@
           </p:pic>
         </mc:Fallback>
       </mc:AlternateContent>
-      <mc:AlternateContent xmlns:mc="http://schemas.openxmlformats.org/markup-compatibility/2006">
-        <mc:Choice xmlns:p14="http://schemas.microsoft.com/office/powerpoint/2010/main" Requires="p14">
+      <mc:AlternateContent xmlns:mc="http://schemas.openxmlformats.org/markup-compatibility/2006" xmlns:p14="http://schemas.microsoft.com/office/powerpoint/2010/main">
+        <mc:Choice Requires="p14">
           <p:contentPart p14:bwMode="auto" r:id="rId4">
             <p14:nvContentPartPr>
               <p14:cNvPr id="6" name="墨迹 5">
@@ -9782,7 +9782,7 @@
             </p14:xfrm>
           </p:contentPart>
         </mc:Choice>
-        <mc:Fallback>
+        <mc:Fallback xmlns="">
           <p:pic>
             <p:nvPicPr>
               <p:cNvPr id="6" name="墨迹 5">
@@ -10740,8 +10740,8 @@
         </p:nvSpPr>
         <p:spPr>
           <a:xfrm>
-            <a:off x="8813089" y="1654799"/>
-            <a:ext cx="1564187" cy="861774"/>
+            <a:off x="8813089" y="1848489"/>
+            <a:ext cx="2031694" cy="861774"/>
           </a:xfrm>
           <a:prstGeom prst="rect">
             <a:avLst/>
@@ -10763,7 +10763,7 @@
               <a:rPr kumimoji="1" lang="en-US" altLang="zh-CN" sz="1600" dirty="0">
                 <a:latin typeface="Courier" pitchFamily="2" charset="0"/>
               </a:rPr>
-              <a:t>name: "Yu"</a:t>
+              <a:t>name: ”Tom"</a:t>
             </a:r>
           </a:p>
           <a:p>
@@ -10801,8 +10801,8 @@
         </p:nvSpPr>
         <p:spPr>
           <a:xfrm>
-            <a:off x="10427334" y="1650270"/>
-            <a:ext cx="1564186" cy="861774"/>
+            <a:off x="8813089" y="3594425"/>
+            <a:ext cx="2031695" cy="861774"/>
           </a:xfrm>
           <a:prstGeom prst="rect">
             <a:avLst/>
@@ -10832,7 +10832,7 @@
               <a:rPr kumimoji="1" lang="en-US" altLang="zh-CN" sz="1600" dirty="0">
                 <a:latin typeface="Courier" pitchFamily="2" charset="0"/>
               </a:rPr>
-              <a:t>born: 2001</a:t>
+              <a:t>born: 2002</a:t>
             </a:r>
           </a:p>
           <a:p>
@@ -10862,14 +10862,14 @@
         </p:nvSpPr>
         <p:spPr>
           <a:xfrm>
-            <a:off x="8813089" y="1106332"/>
-            <a:ext cx="3228491" cy="369332"/>
+            <a:off x="8763031" y="4931174"/>
+            <a:ext cx="2081754" cy="307777"/>
           </a:xfrm>
           <a:prstGeom prst="rect">
             <a:avLst/>
           </a:prstGeom>
           <a:solidFill>
-            <a:schemeClr val="accent6">
+            <a:schemeClr val="accent5">
               <a:lumMod val="20000"/>
               <a:lumOff val="80000"/>
             </a:schemeClr>
@@ -10882,26 +10882,29 @@
           <a:lstStyle/>
           <a:p>
             <a:r>
-              <a:rPr lang="en" altLang="zh-CN" dirty="0" err="1">
-                <a:solidFill>
-                  <a:srgbClr val="001080"/>
-                </a:solidFill>
-                <a:latin typeface="Menlo" panose="020B0609030804020204" pitchFamily="49" charset="0"/>
+              <a:rPr kumimoji="1" lang="en" altLang="zh-CN" sz="1400" dirty="0" err="1">
+                <a:latin typeface="Courier" pitchFamily="2" charset="0"/>
               </a:rPr>
               <a:t>student_total</a:t>
             </a:r>
             <a:r>
-              <a:rPr lang="en" altLang="zh-CN" dirty="0">
-                <a:solidFill>
-                  <a:srgbClr val="001080"/>
-                </a:solidFill>
-                <a:latin typeface="Menlo" panose="020B0609030804020204" pitchFamily="49" charset="0"/>
-              </a:rPr>
-              <a:t>:  0</a:t>
-            </a:r>
-            <a:endParaRPr kumimoji="1" lang="en-US" altLang="zh-CN" dirty="0">
-              <a:latin typeface="Courier" pitchFamily="2" charset="0"/>
-            </a:endParaRPr>
+              <a:rPr kumimoji="1" lang="en" altLang="zh-CN" sz="1400" dirty="0">
+                <a:latin typeface="Courier" pitchFamily="2" charset="0"/>
+              </a:rPr>
+              <a:t>:</a:t>
+            </a:r>
+            <a:r>
+              <a:rPr kumimoji="1" lang="zh-CN" altLang="en-US" sz="1400" dirty="0">
+                <a:latin typeface="Courier" pitchFamily="2" charset="0"/>
+              </a:rPr>
+              <a:t> </a:t>
+            </a:r>
+            <a:r>
+              <a:rPr kumimoji="1" lang="en-US" altLang="zh-CN" sz="1400" dirty="0">
+                <a:latin typeface="Courier" pitchFamily="2" charset="0"/>
+              </a:rPr>
+              <a:t>0</a:t>
+            </a:r>
           </a:p>
         </p:txBody>
       </p:sp>
@@ -10919,8 +10922,8 @@
         </p:nvSpPr>
         <p:spPr>
           <a:xfrm>
-            <a:off x="8813090" y="2620040"/>
-            <a:ext cx="1564186" cy="861774"/>
+            <a:off x="8813090" y="2721457"/>
+            <a:ext cx="2031694" cy="861774"/>
           </a:xfrm>
           <a:prstGeom prst="rect">
             <a:avLst/>
@@ -10942,7 +10945,7 @@
               <a:rPr kumimoji="1" lang="en-US" altLang="zh-CN" sz="1600" dirty="0">
                 <a:latin typeface="Courier" pitchFamily="2" charset="0"/>
               </a:rPr>
-              <a:t>name: ”Tom"</a:t>
+              <a:t>name: ”Bob"</a:t>
             </a:r>
           </a:p>
           <a:p>
@@ -10980,7 +10983,7 @@
         </p:nvSpPr>
         <p:spPr>
           <a:xfrm>
-            <a:off x="11047363" y="1113461"/>
+            <a:off x="10426974" y="4916058"/>
             <a:ext cx="324128" cy="369332"/>
           </a:xfrm>
           <a:prstGeom prst="rect">
@@ -11030,7 +11033,7 @@
         </p:nvSpPr>
         <p:spPr>
           <a:xfrm>
-            <a:off x="11029672" y="1104981"/>
+            <a:off x="10409283" y="4907578"/>
             <a:ext cx="324128" cy="369332"/>
           </a:xfrm>
           <a:prstGeom prst="rect">
@@ -11080,7 +11083,7 @@
         </p:nvSpPr>
         <p:spPr>
           <a:xfrm>
-            <a:off x="11047363" y="1112110"/>
+            <a:off x="10426974" y="4914707"/>
             <a:ext cx="324128" cy="369332"/>
           </a:xfrm>
           <a:prstGeom prst="rect">
@@ -11295,7 +11298,7 @@
                                           </p:stCondLst>
                                         </p:cTn>
                                         <p:tgtEl>
-                                          <p:spTgt spid="7"/>
+                                          <p:spTgt spid="9"/>
                                         </p:tgtEl>
                                         <p:attrNameLst>
                                           <p:attrName>style.visibility</p:attrName>
@@ -11385,7 +11388,7 @@
                                           </p:stCondLst>
                                         </p:cTn>
                                         <p:tgtEl>
-                                          <p:spTgt spid="9"/>
+                                          <p:spTgt spid="7"/>
                                         </p:tgtEl>
                                         <p:attrNameLst>
                                           <p:attrName>style.visibility</p:attrName>
@@ -12166,7 +12169,7 @@
           <p:nvPr>
             <p:extLst>
               <p:ext uri="{D42A27DB-BD31-4B8C-83A1-F6EECF244321}">
-                <p14:modId xmlns:p14="http://schemas.microsoft.com/office/powerpoint/2010/main" val="2507523619"/>
+                <p14:modId xmlns:p14="http://schemas.microsoft.com/office/powerpoint/2010/main" val="1824239013"/>
               </p:ext>
             </p:extLst>
           </p:nvPr>
@@ -14768,7 +14771,7 @@
         </p:nvSpPr>
         <p:spPr>
           <a:xfrm>
-            <a:off x="838199" y="1326995"/>
+            <a:off x="838200" y="973351"/>
             <a:ext cx="11053879" cy="1910191"/>
           </a:xfrm>
         </p:spPr>
@@ -14849,8 +14852,8 @@
         </p:nvSpPr>
         <p:spPr>
           <a:xfrm>
-            <a:off x="1247820" y="3457136"/>
-            <a:ext cx="5856365" cy="3416320"/>
+            <a:off x="2529702" y="2883542"/>
+            <a:ext cx="5856365" cy="3970318"/>
           </a:xfrm>
           <a:prstGeom prst="rect">
             <a:avLst/>
@@ -15185,6 +15188,179 @@
           </a:p>
           <a:p>
             <a:r>
+              <a:rPr lang="en" altLang="zh-CN" b="0" dirty="0">
+                <a:solidFill>
+                  <a:srgbClr val="AF00DB"/>
+                </a:solidFill>
+                <a:effectLst/>
+                <a:latin typeface="Menlo" panose="020B0609030804020204" pitchFamily="49" charset="0"/>
+              </a:rPr>
+              <a:t>        if</a:t>
+            </a:r>
+            <a:r>
+              <a:rPr lang="en" altLang="zh-CN" b="0" dirty="0">
+                <a:solidFill>
+                  <a:srgbClr val="000000"/>
+                </a:solidFill>
+                <a:effectLst/>
+                <a:latin typeface="Menlo" panose="020B0609030804020204" pitchFamily="49" charset="0"/>
+              </a:rPr>
+              <a:t> (</a:t>
+            </a:r>
+            <a:r>
+              <a:rPr lang="en" altLang="zh-CN" b="0" dirty="0">
+                <a:solidFill>
+                  <a:srgbClr val="001080"/>
+                </a:solidFill>
+                <a:effectLst/>
+                <a:latin typeface="Menlo" panose="020B0609030804020204" pitchFamily="49" charset="0"/>
+              </a:rPr>
+              <a:t>s</a:t>
+            </a:r>
+            <a:r>
+              <a:rPr lang="en" altLang="zh-CN" b="0" dirty="0">
+                <a:solidFill>
+                  <a:srgbClr val="000000"/>
+                </a:solidFill>
+                <a:effectLst/>
+                <a:latin typeface="Menlo" panose="020B0609030804020204" pitchFamily="49" charset="0"/>
+              </a:rPr>
+              <a:t> == </a:t>
+            </a:r>
+            <a:r>
+              <a:rPr lang="en" altLang="zh-CN" b="0" dirty="0">
+                <a:solidFill>
+                  <a:srgbClr val="0000FF"/>
+                </a:solidFill>
+                <a:effectLst/>
+                <a:latin typeface="Menlo" panose="020B0609030804020204" pitchFamily="49" charset="0"/>
+              </a:rPr>
+              <a:t>NULL</a:t>
+            </a:r>
+            <a:r>
+              <a:rPr lang="en" altLang="zh-CN" b="0" dirty="0">
+                <a:solidFill>
+                  <a:srgbClr val="000000"/>
+                </a:solidFill>
+                <a:effectLst/>
+                <a:latin typeface="Menlo" panose="020B0609030804020204" pitchFamily="49" charset="0"/>
+              </a:rPr>
+              <a:t>){...}</a:t>
+            </a:r>
+          </a:p>
+          <a:p>
+            <a:r>
+              <a:rPr lang="zh-CN" altLang="en-US" dirty="0">
+                <a:solidFill>
+                  <a:srgbClr val="000000"/>
+                </a:solidFill>
+                <a:latin typeface="Menlo" panose="020B0609030804020204" pitchFamily="49" charset="0"/>
+              </a:rPr>
+              <a:t>        </a:t>
+            </a:r>
+            <a:r>
+              <a:rPr lang="en" altLang="zh-CN" b="0" dirty="0" err="1">
+                <a:solidFill>
+                  <a:srgbClr val="267F99"/>
+                </a:solidFill>
+                <a:effectLst/>
+                <a:latin typeface="Menlo" panose="020B0609030804020204" pitchFamily="49" charset="0"/>
+              </a:rPr>
+              <a:t>size_t</a:t>
+            </a:r>
+            <a:r>
+              <a:rPr lang="en" altLang="zh-CN" b="0" dirty="0">
+                <a:solidFill>
+                  <a:srgbClr val="000000"/>
+                </a:solidFill>
+                <a:effectLst/>
+                <a:latin typeface="Menlo" panose="020B0609030804020204" pitchFamily="49" charset="0"/>
+              </a:rPr>
+              <a:t> </a:t>
+            </a:r>
+            <a:r>
+              <a:rPr lang="en" altLang="zh-CN" b="0" dirty="0" err="1">
+                <a:solidFill>
+                  <a:srgbClr val="001080"/>
+                </a:solidFill>
+                <a:effectLst/>
+                <a:latin typeface="Menlo" panose="020B0609030804020204" pitchFamily="49" charset="0"/>
+              </a:rPr>
+              <a:t>len</a:t>
+            </a:r>
+            <a:r>
+              <a:rPr lang="en" altLang="zh-CN" b="0" dirty="0">
+                <a:solidFill>
+                  <a:srgbClr val="000000"/>
+                </a:solidFill>
+                <a:effectLst/>
+                <a:latin typeface="Menlo" panose="020B0609030804020204" pitchFamily="49" charset="0"/>
+              </a:rPr>
+              <a:t> = </a:t>
+            </a:r>
+            <a:r>
+              <a:rPr lang="en" altLang="zh-CN" b="0" dirty="0" err="1">
+                <a:solidFill>
+                  <a:srgbClr val="0000FF"/>
+                </a:solidFill>
+                <a:effectLst/>
+                <a:latin typeface="Menlo" panose="020B0609030804020204" pitchFamily="49" charset="0"/>
+              </a:rPr>
+              <a:t>sizeof</a:t>
+            </a:r>
+            <a:r>
+              <a:rPr lang="en" altLang="zh-CN" b="0" dirty="0">
+                <a:solidFill>
+                  <a:srgbClr val="000000"/>
+                </a:solidFill>
+                <a:effectLst/>
+                <a:latin typeface="Menlo" panose="020B0609030804020204" pitchFamily="49" charset="0"/>
+              </a:rPr>
+              <a:t>(</a:t>
+            </a:r>
+            <a:r>
+              <a:rPr lang="en" altLang="zh-CN" b="0" dirty="0">
+                <a:solidFill>
+                  <a:srgbClr val="001080"/>
+                </a:solidFill>
+                <a:effectLst/>
+                <a:latin typeface="Menlo" panose="020B0609030804020204" pitchFamily="49" charset="0"/>
+              </a:rPr>
+              <a:t>name</a:t>
+            </a:r>
+            <a:r>
+              <a:rPr lang="en" altLang="zh-CN" b="0" dirty="0">
+                <a:solidFill>
+                  <a:srgbClr val="000000"/>
+                </a:solidFill>
+                <a:effectLst/>
+                <a:latin typeface="Menlo" panose="020B0609030804020204" pitchFamily="49" charset="0"/>
+              </a:rPr>
+              <a:t>) - </a:t>
+            </a:r>
+            <a:r>
+              <a:rPr lang="en" altLang="zh-CN" b="0" dirty="0">
+                <a:solidFill>
+                  <a:srgbClr val="098658"/>
+                </a:solidFill>
+                <a:effectLst/>
+                <a:latin typeface="Menlo" panose="020B0609030804020204" pitchFamily="49" charset="0"/>
+              </a:rPr>
+              <a:t>1</a:t>
+            </a:r>
+            <a:r>
+              <a:rPr lang="en" altLang="zh-CN" b="0" dirty="0">
+                <a:solidFill>
+                  <a:srgbClr val="000000"/>
+                </a:solidFill>
+                <a:effectLst/>
+                <a:latin typeface="Menlo" panose="020B0609030804020204" pitchFamily="49" charset="0"/>
+              </a:rPr>
+              <a:t>;</a:t>
+            </a:r>
+          </a:p>
+          <a:p>
+            <a:r>
               <a:rPr lang="en" altLang="zh-CN" dirty="0">
                 <a:solidFill>
                   <a:srgbClr val="008000"/>
@@ -15286,6 +15462,88 @@
           </a:p>
           <a:p>
             <a:r>
+              <a:rPr lang="en" altLang="zh-CN" b="0" dirty="0">
+                <a:solidFill>
+                  <a:srgbClr val="001080"/>
+                </a:solidFill>
+                <a:effectLst/>
+                <a:latin typeface="Menlo" panose="020B0609030804020204" pitchFamily="49" charset="0"/>
+              </a:rPr>
+              <a:t>        name</a:t>
+            </a:r>
+            <a:r>
+              <a:rPr lang="en" altLang="zh-CN" b="0" dirty="0">
+                <a:solidFill>
+                  <a:srgbClr val="000000"/>
+                </a:solidFill>
+                <a:effectLst/>
+                <a:latin typeface="Menlo" panose="020B0609030804020204" pitchFamily="49" charset="0"/>
+              </a:rPr>
+              <a:t>[</a:t>
+            </a:r>
+            <a:r>
+              <a:rPr lang="en" altLang="zh-CN" b="0" dirty="0" err="1">
+                <a:solidFill>
+                  <a:srgbClr val="001080"/>
+                </a:solidFill>
+                <a:effectLst/>
+                <a:latin typeface="Menlo" panose="020B0609030804020204" pitchFamily="49" charset="0"/>
+              </a:rPr>
+              <a:t>len</a:t>
+            </a:r>
+            <a:r>
+              <a:rPr lang="en" altLang="zh-CN" b="0" dirty="0">
+                <a:solidFill>
+                  <a:srgbClr val="000000"/>
+                </a:solidFill>
+                <a:effectLst/>
+                <a:latin typeface="Menlo" panose="020B0609030804020204" pitchFamily="49" charset="0"/>
+              </a:rPr>
+              <a:t>] = </a:t>
+            </a:r>
+            <a:r>
+              <a:rPr lang="en" altLang="zh-CN" b="0" dirty="0">
+                <a:solidFill>
+                  <a:srgbClr val="A31515"/>
+                </a:solidFill>
+                <a:effectLst/>
+                <a:latin typeface="Menlo" panose="020B0609030804020204" pitchFamily="49" charset="0"/>
+              </a:rPr>
+              <a:t>'</a:t>
+            </a:r>
+            <a:r>
+              <a:rPr lang="en" altLang="zh-CN" b="0" dirty="0">
+                <a:solidFill>
+                  <a:srgbClr val="EE0000"/>
+                </a:solidFill>
+                <a:effectLst/>
+                <a:latin typeface="Menlo" panose="020B0609030804020204" pitchFamily="49" charset="0"/>
+              </a:rPr>
+              <a:t>\0</a:t>
+            </a:r>
+            <a:r>
+              <a:rPr lang="en" altLang="zh-CN" b="0" dirty="0">
+                <a:solidFill>
+                  <a:srgbClr val="A31515"/>
+                </a:solidFill>
+                <a:effectLst/>
+                <a:latin typeface="Menlo" panose="020B0609030804020204" pitchFamily="49" charset="0"/>
+              </a:rPr>
+              <a:t>'</a:t>
+            </a:r>
+            <a:r>
+              <a:rPr lang="en" altLang="zh-CN" b="0" dirty="0">
+                <a:solidFill>
+                  <a:srgbClr val="000000"/>
+                </a:solidFill>
+                <a:effectLst/>
+                <a:latin typeface="Menlo" panose="020B0609030804020204" pitchFamily="49" charset="0"/>
+              </a:rPr>
+              <a:t>;</a:t>
+            </a:r>
+          </a:p>
+          <a:p>
+            <a:r>
               <a:rPr lang="en" altLang="zh-CN" dirty="0">
                 <a:solidFill>
                   <a:srgbClr val="000000"/>
@@ -15366,18 +15624,7 @@
                 </a:solidFill>
                 <a:latin typeface="Menlo" panose="020B0609030804020204" pitchFamily="49" charset="0"/>
               </a:rPr>
-              <a:t>)</a:t>
-            </a:r>
-          </a:p>
-          <a:p>
-            <a:r>
-              <a:rPr lang="en" altLang="zh-CN" dirty="0">
-                <a:solidFill>
-                  <a:srgbClr val="000000"/>
-                </a:solidFill>
-                <a:latin typeface="Menlo" panose="020B0609030804020204" pitchFamily="49" charset="0"/>
-              </a:rPr>
-              <a:t>    { ...</a:t>
+              <a:t>) { ... } </a:t>
             </a:r>
           </a:p>
         </p:txBody>
@@ -15396,7 +15643,7 @@
         </p:nvSpPr>
         <p:spPr>
           <a:xfrm>
-            <a:off x="4908400" y="3831830"/>
+            <a:off x="7262880" y="3656665"/>
             <a:ext cx="3451758" cy="707886"/>
           </a:xfrm>
           <a:prstGeom prst="rect">
@@ -15531,7 +15778,7 @@
         </p:nvSpPr>
         <p:spPr>
           <a:xfrm rot="1406566">
-            <a:off x="6972579" y="2305344"/>
+            <a:off x="7977737" y="2249563"/>
             <a:ext cx="4378251" cy="923330"/>
           </a:xfrm>
           <a:prstGeom prst="rect">
@@ -15594,7 +15841,7 @@
         </p:nvSpPr>
         <p:spPr>
           <a:xfrm rot="2241308">
-            <a:off x="7680891" y="2801461"/>
+            <a:off x="9749287" y="3044183"/>
             <a:ext cx="560417" cy="980649"/>
           </a:xfrm>
           <a:prstGeom prst="downArrow">
@@ -15653,7 +15900,7 @@
         </p:nvSpPr>
         <p:spPr>
           <a:xfrm>
-            <a:off x="106678" y="3134398"/>
+            <a:off x="0" y="3134594"/>
             <a:ext cx="2339102" cy="400110"/>
           </a:xfrm>
           <a:prstGeom prst="rect">
@@ -16013,7 +16260,7 @@
         </p:nvSpPr>
         <p:spPr>
           <a:xfrm>
-            <a:off x="838199" y="1326995"/>
+            <a:off x="838200" y="1149765"/>
             <a:ext cx="11053879" cy="1910191"/>
           </a:xfrm>
         </p:spPr>
@@ -16062,7 +16309,7 @@
         </p:nvSpPr>
         <p:spPr>
           <a:xfrm>
-            <a:off x="1254247" y="2921929"/>
+            <a:off x="2772476" y="2884723"/>
             <a:ext cx="5856365" cy="3970318"/>
           </a:xfrm>
           <a:prstGeom prst="rect">
@@ -16411,101 +16658,11 @@
             <a:r>
               <a:rPr lang="en" altLang="zh-CN" dirty="0">
                 <a:solidFill>
-                  <a:srgbClr val="008000"/>
-                </a:solidFill>
-                <a:latin typeface="Menlo" panose="020B0609030804020204" pitchFamily="49" charset="0"/>
-              </a:rPr>
-              <a:t>        </a:t>
-            </a:r>
-            <a:r>
-              <a:rPr lang="en" altLang="zh-CN" dirty="0" err="1">
-                <a:solidFill>
-                  <a:srgbClr val="795E26"/>
-                </a:solidFill>
-                <a:latin typeface="Menlo" panose="020B0609030804020204" pitchFamily="49" charset="0"/>
-              </a:rPr>
-              <a:t>strncpy</a:t>
-            </a:r>
-            <a:r>
-              <a:rPr lang="en" altLang="zh-CN" dirty="0">
-                <a:solidFill>
-                  <a:srgbClr val="000000"/>
-                </a:solidFill>
-                <a:latin typeface="Menlo" panose="020B0609030804020204" pitchFamily="49" charset="0"/>
-              </a:rPr>
-              <a:t>(</a:t>
-            </a:r>
-            <a:r>
-              <a:rPr lang="en" altLang="zh-CN" dirty="0">
-                <a:solidFill>
-                  <a:srgbClr val="001080"/>
-                </a:solidFill>
-                <a:latin typeface="Menlo" panose="020B0609030804020204" pitchFamily="49" charset="0"/>
-              </a:rPr>
-              <a:t>name</a:t>
-            </a:r>
-            <a:r>
-              <a:rPr lang="en" altLang="zh-CN" dirty="0">
-                <a:solidFill>
-                  <a:srgbClr val="000000"/>
-                </a:solidFill>
-                <a:latin typeface="Menlo" panose="020B0609030804020204" pitchFamily="49" charset="0"/>
-              </a:rPr>
-              <a:t>, </a:t>
-            </a:r>
-            <a:r>
-              <a:rPr lang="en" altLang="zh-CN" dirty="0">
-                <a:solidFill>
-                  <a:srgbClr val="001080"/>
-                </a:solidFill>
-                <a:latin typeface="Menlo" panose="020B0609030804020204" pitchFamily="49" charset="0"/>
-              </a:rPr>
-              <a:t>s</a:t>
-            </a:r>
-            <a:r>
-              <a:rPr lang="en" altLang="zh-CN" dirty="0">
-                <a:solidFill>
-                  <a:srgbClr val="000000"/>
-                </a:solidFill>
-                <a:latin typeface="Menlo" panose="020B0609030804020204" pitchFamily="49" charset="0"/>
-              </a:rPr>
-              <a:t>, </a:t>
-            </a:r>
-            <a:r>
-              <a:rPr lang="en" altLang="zh-CN" dirty="0" err="1">
-                <a:solidFill>
-                  <a:srgbClr val="0000FF"/>
-                </a:solidFill>
-                <a:latin typeface="Menlo" panose="020B0609030804020204" pitchFamily="49" charset="0"/>
-              </a:rPr>
-              <a:t>sizeof</a:t>
-            </a:r>
-            <a:r>
-              <a:rPr lang="en" altLang="zh-CN" dirty="0">
-                <a:solidFill>
-                  <a:srgbClr val="000000"/>
-                </a:solidFill>
-                <a:latin typeface="Menlo" panose="020B0609030804020204" pitchFamily="49" charset="0"/>
-              </a:rPr>
-              <a:t>(</a:t>
-            </a:r>
-            <a:r>
-              <a:rPr lang="en" altLang="zh-CN" dirty="0">
-                <a:solidFill>
-                  <a:srgbClr val="001080"/>
-                </a:solidFill>
-                <a:latin typeface="Menlo" panose="020B0609030804020204" pitchFamily="49" charset="0"/>
-              </a:rPr>
-              <a:t>name</a:t>
-            </a:r>
-            <a:r>
-              <a:rPr lang="en" altLang="zh-CN" dirty="0">
-                <a:solidFill>
-                  <a:srgbClr val="000000"/>
-                </a:solidFill>
-                <a:latin typeface="Menlo" panose="020B0609030804020204" pitchFamily="49" charset="0"/>
-              </a:rPr>
-              <a:t>));</a:t>
+                  <a:srgbClr val="000000"/>
+                </a:solidFill>
+                <a:latin typeface="Menlo" panose="020B0609030804020204" pitchFamily="49" charset="0"/>
+              </a:rPr>
+              <a:t>        ...</a:t>
             </a:r>
           </a:p>
           <a:p>
@@ -16631,7 +16788,7 @@
         </p:nvSpPr>
         <p:spPr>
           <a:xfrm>
-            <a:off x="5125088" y="2759923"/>
+            <a:off x="5752740" y="2426526"/>
             <a:ext cx="3451758" cy="707886"/>
           </a:xfrm>
           <a:prstGeom prst="rect">
@@ -16885,7 +17042,7 @@
         </p:nvSpPr>
         <p:spPr>
           <a:xfrm>
-            <a:off x="84696" y="2640871"/>
+            <a:off x="164908" y="2484613"/>
             <a:ext cx="3262432" cy="400110"/>
           </a:xfrm>
           <a:prstGeom prst="rect">
@@ -19586,8 +19743,8 @@
         </p:nvSpPr>
         <p:spPr>
           <a:xfrm>
-            <a:off x="0" y="1822628"/>
-            <a:ext cx="5895859" cy="5078313"/>
+            <a:off x="0" y="1670225"/>
+            <a:ext cx="5895859" cy="5355312"/>
           </a:xfrm>
           <a:prstGeom prst="rect">
             <a:avLst/>
@@ -19606,6 +19763,44 @@
           <a:lstStyle/>
           <a:p>
             <a:r>
+              <a:rPr lang="en" altLang="zh-CN" b="0" dirty="0">
+                <a:solidFill>
+                  <a:srgbClr val="AF00DB"/>
+                </a:solidFill>
+                <a:effectLst/>
+                <a:latin typeface="Menlo" panose="020B0609030804020204" pitchFamily="49" charset="0"/>
+              </a:rPr>
+              <a:t>#pragma</a:t>
+            </a:r>
+            <a:r>
+              <a:rPr lang="en" altLang="zh-CN" b="0" dirty="0">
+                <a:solidFill>
+                  <a:srgbClr val="0000FF"/>
+                </a:solidFill>
+                <a:effectLst/>
+                <a:latin typeface="Menlo" panose="020B0609030804020204" pitchFamily="49" charset="0"/>
+              </a:rPr>
+              <a:t> </a:t>
+            </a:r>
+            <a:r>
+              <a:rPr lang="en" altLang="zh-CN" b="0" dirty="0">
+                <a:solidFill>
+                  <a:srgbClr val="E50000"/>
+                </a:solidFill>
+                <a:effectLst/>
+                <a:latin typeface="Menlo" panose="020B0609030804020204" pitchFamily="49" charset="0"/>
+              </a:rPr>
+              <a:t>once</a:t>
+            </a:r>
+            <a:endParaRPr lang="en" altLang="zh-CN" dirty="0">
+              <a:solidFill>
+                <a:srgbClr val="0000FF"/>
+              </a:solidFill>
+              <a:latin typeface="Menlo" panose="020B0609030804020204" pitchFamily="49" charset="0"/>
+            </a:endParaRPr>
+          </a:p>
+          <a:p>
+            <a:r>
               <a:rPr lang="en" altLang="zh-CN" dirty="0">
                 <a:solidFill>
                   <a:srgbClr val="0000FF"/>
@@ -20002,22 +20197,86 @@
           </a:p>
           <a:p>
             <a:r>
+              <a:rPr lang="en-US" altLang="zh-CN" dirty="0">
+                <a:solidFill>
+                  <a:srgbClr val="795E26"/>
+                </a:solidFill>
+                <a:latin typeface="Menlo" panose="020B0609030804020204" pitchFamily="49" charset="0"/>
+              </a:rPr>
+              <a:t>        </a:t>
+            </a:r>
+            <a:r>
+              <a:rPr lang="en-US" altLang="zh-CN" dirty="0">
+                <a:solidFill>
+                  <a:srgbClr val="098658"/>
+                </a:solidFill>
+                <a:latin typeface="Menlo" panose="020B0609030804020204" pitchFamily="49" charset="0"/>
+              </a:rPr>
+              <a:t>// ...</a:t>
+            </a:r>
+            <a:endParaRPr lang="en" altLang="zh-CN" dirty="0">
+              <a:solidFill>
+                <a:srgbClr val="000000"/>
+              </a:solidFill>
+              <a:latin typeface="Menlo" panose="020B0609030804020204" pitchFamily="49" charset="0"/>
+            </a:endParaRPr>
+          </a:p>
+          <a:p>
+            <a:r>
               <a:rPr lang="zh-CN" altLang="en-US" dirty="0">
                 <a:solidFill>
+                  <a:srgbClr val="000000"/>
+                </a:solidFill>
+                <a:latin typeface="Menlo" panose="020B0609030804020204" pitchFamily="49" charset="0"/>
+              </a:rPr>
+              <a:t>    </a:t>
+            </a:r>
+            <a:r>
+              <a:rPr lang="en" altLang="zh-CN" dirty="0">
+                <a:solidFill>
+                  <a:srgbClr val="000000"/>
+                </a:solidFill>
+                <a:latin typeface="Menlo" panose="020B0609030804020204" pitchFamily="49" charset="0"/>
+              </a:rPr>
+              <a:t>}</a:t>
+            </a:r>
+          </a:p>
+          <a:p>
+            <a:r>
+              <a:rPr lang="zh-CN" altLang="en-US" dirty="0">
+                <a:solidFill>
+                  <a:srgbClr val="0000FF"/>
+                </a:solidFill>
+                <a:latin typeface="Menlo" panose="020B0609030804020204" pitchFamily="49" charset="0"/>
+              </a:rPr>
+              <a:t>    </a:t>
+            </a:r>
+            <a:r>
+              <a:rPr lang="en" altLang="zh-CN" dirty="0">
+                <a:solidFill>
+                  <a:srgbClr val="0000FF"/>
+                </a:solidFill>
+                <a:latin typeface="Menlo" panose="020B0609030804020204" pitchFamily="49" charset="0"/>
+              </a:rPr>
+              <a:t>void</a:t>
+            </a:r>
+            <a:r>
+              <a:rPr lang="en" altLang="zh-CN" dirty="0">
+                <a:solidFill>
+                  <a:srgbClr val="000000"/>
+                </a:solidFill>
+                <a:latin typeface="Menlo" panose="020B0609030804020204" pitchFamily="49" charset="0"/>
+              </a:rPr>
+              <a:t> </a:t>
+            </a:r>
+            <a:r>
+              <a:rPr lang="en" altLang="zh-CN" dirty="0" err="1">
+                <a:solidFill>
                   <a:srgbClr val="795E26"/>
                 </a:solidFill>
                 <a:latin typeface="Menlo" panose="020B0609030804020204" pitchFamily="49" charset="0"/>
               </a:rPr>
-              <a:t>        </a:t>
-            </a:r>
-            <a:r>
-              <a:rPr lang="en" altLang="zh-CN" dirty="0" err="1">
-                <a:solidFill>
-                  <a:srgbClr val="795E26"/>
-                </a:solidFill>
-                <a:latin typeface="Menlo" panose="020B0609030804020204" pitchFamily="49" charset="0"/>
-              </a:rPr>
-              <a:t>strncpy</a:t>
+              <a:t>setBorn</a:t>
             </a:r>
             <a:r>
               <a:rPr lang="en" altLang="zh-CN" dirty="0">
@@ -20031,74 +20290,38 @@
             <a:r>
               <a:rPr lang="en" altLang="zh-CN" dirty="0">
                 <a:solidFill>
+                  <a:srgbClr val="0000FF"/>
+                </a:solidFill>
+                <a:latin typeface="Menlo" panose="020B0609030804020204" pitchFamily="49" charset="0"/>
+              </a:rPr>
+              <a:t>int</a:t>
+            </a:r>
+            <a:r>
+              <a:rPr lang="en" altLang="zh-CN" dirty="0">
+                <a:solidFill>
+                  <a:srgbClr val="000000"/>
+                </a:solidFill>
+                <a:latin typeface="Menlo" panose="020B0609030804020204" pitchFamily="49" charset="0"/>
+              </a:rPr>
+              <a:t> </a:t>
+            </a:r>
+            <a:r>
+              <a:rPr lang="en" altLang="zh-CN" dirty="0">
+                <a:solidFill>
                   <a:srgbClr val="001080"/>
                 </a:solidFill>
                 <a:latin typeface="Menlo" panose="020B0609030804020204" pitchFamily="49" charset="0"/>
               </a:rPr>
-              <a:t>name</a:t>
-            </a:r>
-            <a:r>
-              <a:rPr lang="en" altLang="zh-CN" dirty="0">
-                <a:solidFill>
-                  <a:srgbClr val="000000"/>
-                </a:solidFill>
-                <a:latin typeface="Menlo" panose="020B0609030804020204" pitchFamily="49" charset="0"/>
-              </a:rPr>
-              <a:t>, </a:t>
-            </a:r>
-            <a:r>
-              <a:rPr lang="en" altLang="zh-CN" dirty="0">
-                <a:solidFill>
-                  <a:srgbClr val="001080"/>
-                </a:solidFill>
-                <a:latin typeface="Menlo" panose="020B0609030804020204" pitchFamily="49" charset="0"/>
-              </a:rPr>
-              <a:t>s</a:t>
-            </a:r>
-            <a:r>
-              <a:rPr lang="en" altLang="zh-CN" dirty="0">
-                <a:solidFill>
-                  <a:srgbClr val="000000"/>
-                </a:solidFill>
-                <a:latin typeface="Menlo" panose="020B0609030804020204" pitchFamily="49" charset="0"/>
-              </a:rPr>
-              <a:t>, </a:t>
-            </a:r>
-            <a:r>
-              <a:rPr lang="en" altLang="zh-CN" dirty="0" err="1">
-                <a:solidFill>
-                  <a:srgbClr val="0000FF"/>
-                </a:solidFill>
-                <a:latin typeface="Menlo" panose="020B0609030804020204" pitchFamily="49" charset="0"/>
-              </a:rPr>
-              <a:t>sizeof</a:t>
-            </a:r>
-            <a:r>
-              <a:rPr lang="en" altLang="zh-CN" dirty="0">
-                <a:solidFill>
-                  <a:srgbClr val="000000"/>
-                </a:solidFill>
-                <a:latin typeface="Menlo" panose="020B0609030804020204" pitchFamily="49" charset="0"/>
-              </a:rPr>
-              <a:t>(</a:t>
-            </a:r>
-            <a:r>
-              <a:rPr lang="en" altLang="zh-CN" dirty="0">
-                <a:solidFill>
-                  <a:srgbClr val="001080"/>
-                </a:solidFill>
-                <a:latin typeface="Menlo" panose="020B0609030804020204" pitchFamily="49" charset="0"/>
-              </a:rPr>
-              <a:t>name</a:t>
-            </a:r>
-            <a:r>
-              <a:rPr lang="en" altLang="zh-CN" dirty="0">
-                <a:solidFill>
-                  <a:srgbClr val="000000"/>
-                </a:solidFill>
-                <a:latin typeface="Menlo" panose="020B0609030804020204" pitchFamily="49" charset="0"/>
-              </a:rPr>
-              <a:t>));</a:t>
+              <a:t>b</a:t>
+            </a:r>
+            <a:r>
+              <a:rPr lang="en" altLang="zh-CN" dirty="0">
+                <a:solidFill>
+                  <a:srgbClr val="000000"/>
+                </a:solidFill>
+                <a:latin typeface="Menlo" panose="020B0609030804020204" pitchFamily="49" charset="0"/>
+              </a:rPr>
+              <a:t>)</a:t>
             </a:r>
           </a:p>
           <a:p>
@@ -20118,157 +20341,18 @@
                 </a:solidFill>
                 <a:latin typeface="Menlo" panose="020B0609030804020204" pitchFamily="49" charset="0"/>
               </a:rPr>
-              <a:t>}</a:t>
-            </a:r>
-          </a:p>
-          <a:p>
-            <a:r>
-              <a:rPr lang="zh-CN" altLang="en-US" dirty="0">
-                <a:solidFill>
-                  <a:srgbClr val="0000FF"/>
-                </a:solidFill>
-                <a:latin typeface="Menlo" panose="020B0609030804020204" pitchFamily="49" charset="0"/>
-              </a:rPr>
-              <a:t>    </a:t>
-            </a:r>
-            <a:r>
-              <a:rPr lang="en" altLang="zh-CN" dirty="0">
-                <a:solidFill>
-                  <a:srgbClr val="0000FF"/>
-                </a:solidFill>
-                <a:latin typeface="Menlo" panose="020B0609030804020204" pitchFamily="49" charset="0"/>
-              </a:rPr>
-              <a:t>void</a:t>
-            </a:r>
-            <a:r>
-              <a:rPr lang="en" altLang="zh-CN" dirty="0">
-                <a:solidFill>
-                  <a:srgbClr val="000000"/>
-                </a:solidFill>
-                <a:latin typeface="Menlo" panose="020B0609030804020204" pitchFamily="49" charset="0"/>
-              </a:rPr>
-              <a:t> </a:t>
-            </a:r>
-            <a:r>
-              <a:rPr lang="en" altLang="zh-CN" dirty="0" err="1">
-                <a:solidFill>
-                  <a:srgbClr val="795E26"/>
-                </a:solidFill>
-                <a:latin typeface="Menlo" panose="020B0609030804020204" pitchFamily="49" charset="0"/>
-              </a:rPr>
-              <a:t>setBorn</a:t>
-            </a:r>
-            <a:r>
-              <a:rPr lang="en" altLang="zh-CN" dirty="0">
-                <a:solidFill>
-                  <a:srgbClr val="000000"/>
-                </a:solidFill>
-                <a:latin typeface="Menlo" panose="020B0609030804020204" pitchFamily="49" charset="0"/>
-              </a:rPr>
-              <a:t>(</a:t>
-            </a:r>
-            <a:r>
-              <a:rPr lang="en" altLang="zh-CN" dirty="0">
-                <a:solidFill>
-                  <a:srgbClr val="0000FF"/>
-                </a:solidFill>
-                <a:latin typeface="Menlo" panose="020B0609030804020204" pitchFamily="49" charset="0"/>
-              </a:rPr>
-              <a:t>int</a:t>
-            </a:r>
-            <a:r>
-              <a:rPr lang="en" altLang="zh-CN" dirty="0">
-                <a:solidFill>
-                  <a:srgbClr val="000000"/>
-                </a:solidFill>
-                <a:latin typeface="Menlo" panose="020B0609030804020204" pitchFamily="49" charset="0"/>
-              </a:rPr>
-              <a:t> </a:t>
-            </a:r>
-            <a:r>
-              <a:rPr lang="en" altLang="zh-CN" dirty="0">
-                <a:solidFill>
-                  <a:srgbClr val="001080"/>
-                </a:solidFill>
-                <a:latin typeface="Menlo" panose="020B0609030804020204" pitchFamily="49" charset="0"/>
-              </a:rPr>
-              <a:t>b</a:t>
-            </a:r>
-            <a:r>
-              <a:rPr lang="en" altLang="zh-CN" dirty="0">
-                <a:solidFill>
-                  <a:srgbClr val="000000"/>
-                </a:solidFill>
-                <a:latin typeface="Menlo" panose="020B0609030804020204" pitchFamily="49" charset="0"/>
-              </a:rPr>
-              <a:t>)</a:t>
-            </a:r>
-          </a:p>
-          <a:p>
-            <a:r>
-              <a:rPr lang="zh-CN" altLang="en-US" dirty="0">
-                <a:solidFill>
-                  <a:srgbClr val="000000"/>
-                </a:solidFill>
-                <a:latin typeface="Menlo" panose="020B0609030804020204" pitchFamily="49" charset="0"/>
-              </a:rPr>
-              <a:t>    </a:t>
-            </a:r>
-            <a:r>
-              <a:rPr lang="en" altLang="zh-CN" dirty="0">
-                <a:solidFill>
-                  <a:srgbClr val="000000"/>
-                </a:solidFill>
-                <a:latin typeface="Menlo" panose="020B0609030804020204" pitchFamily="49" charset="0"/>
-              </a:rPr>
               <a:t>{</a:t>
             </a:r>
           </a:p>
           <a:p>
             <a:r>
-              <a:rPr lang="zh-CN" altLang="en-US" dirty="0">
-                <a:solidFill>
-                  <a:srgbClr val="001080"/>
-                </a:solidFill>
-                <a:latin typeface="Menlo" panose="020B0609030804020204" pitchFamily="49" charset="0"/>
-              </a:rPr>
-              <a:t>        </a:t>
-            </a:r>
-            <a:r>
-              <a:rPr lang="en" altLang="zh-CN" dirty="0">
-                <a:solidFill>
-                  <a:srgbClr val="001080"/>
-                </a:solidFill>
-                <a:latin typeface="Menlo" panose="020B0609030804020204" pitchFamily="49" charset="0"/>
-              </a:rPr>
-              <a:t>born</a:t>
-            </a:r>
-            <a:r>
-              <a:rPr lang="en" altLang="zh-CN" dirty="0">
-                <a:solidFill>
-                  <a:srgbClr val="000000"/>
-                </a:solidFill>
-                <a:latin typeface="Menlo" panose="020B0609030804020204" pitchFamily="49" charset="0"/>
-              </a:rPr>
-              <a:t> = </a:t>
-            </a:r>
-            <a:r>
-              <a:rPr lang="en" altLang="zh-CN" dirty="0">
-                <a:solidFill>
-                  <a:srgbClr val="001080"/>
-                </a:solidFill>
-                <a:latin typeface="Menlo" panose="020B0609030804020204" pitchFamily="49" charset="0"/>
-              </a:rPr>
-              <a:t>b</a:t>
-            </a:r>
-            <a:r>
-              <a:rPr lang="en" altLang="zh-CN" dirty="0">
-                <a:solidFill>
-                  <a:srgbClr val="000000"/>
-                </a:solidFill>
-                <a:latin typeface="Menlo" panose="020B0609030804020204" pitchFamily="49" charset="0"/>
-              </a:rPr>
-              <a:t>;</a:t>
+              <a:rPr lang="en-US" altLang="zh-CN" dirty="0">
+                <a:solidFill>
+                  <a:srgbClr val="098658"/>
+                </a:solidFill>
+                <a:latin typeface="Menlo" panose="020B0609030804020204" pitchFamily="49" charset="0"/>
+              </a:rPr>
+              <a:t>        // ...</a:t>
             </a:r>
           </a:p>
           <a:p>
@@ -20448,8 +20532,8 @@
         </p:nvSpPr>
         <p:spPr>
           <a:xfrm>
-            <a:off x="3524366" y="1348175"/>
-            <a:ext cx="8667634" cy="2862322"/>
+            <a:off x="3524366" y="1670225"/>
+            <a:ext cx="8667634" cy="3139321"/>
           </a:xfrm>
           <a:prstGeom prst="rect">
             <a:avLst/>
@@ -20468,6 +20552,65 @@
           <a:lstStyle/>
           <a:p>
             <a:r>
+              <a:rPr lang="en" altLang="zh-CN" b="0" dirty="0">
+                <a:solidFill>
+                  <a:srgbClr val="AF00DB"/>
+                </a:solidFill>
+                <a:effectLst/>
+                <a:latin typeface="Menlo" panose="020B0609030804020204" pitchFamily="49" charset="0"/>
+              </a:rPr>
+              <a:t>#include</a:t>
+            </a:r>
+            <a:r>
+              <a:rPr lang="en" altLang="zh-CN" b="0" dirty="0">
+                <a:solidFill>
+                  <a:srgbClr val="0000FF"/>
+                </a:solidFill>
+                <a:effectLst/>
+                <a:latin typeface="Menlo" panose="020B0609030804020204" pitchFamily="49" charset="0"/>
+              </a:rPr>
+              <a:t> </a:t>
+            </a:r>
+            <a:r>
+              <a:rPr lang="en" altLang="zh-CN" b="0" dirty="0">
+                <a:solidFill>
+                  <a:srgbClr val="A31515"/>
+                </a:solidFill>
+                <a:effectLst/>
+                <a:latin typeface="Menlo" panose="020B0609030804020204" pitchFamily="49" charset="0"/>
+              </a:rPr>
+              <a:t>"</a:t>
+            </a:r>
+            <a:r>
+              <a:rPr lang="en" altLang="zh-CN" b="0" dirty="0" err="1">
+                <a:solidFill>
+                  <a:srgbClr val="A31515"/>
+                </a:solidFill>
+                <a:effectLst/>
+                <a:latin typeface="Menlo" panose="020B0609030804020204" pitchFamily="49" charset="0"/>
+              </a:rPr>
+              <a:t>student.hpp</a:t>
+            </a:r>
+            <a:r>
+              <a:rPr lang="en" altLang="zh-CN" b="0" dirty="0">
+                <a:solidFill>
+                  <a:srgbClr val="A31515"/>
+                </a:solidFill>
+                <a:effectLst/>
+                <a:latin typeface="Menlo" panose="020B0609030804020204" pitchFamily="49" charset="0"/>
+              </a:rPr>
+              <a:t>"</a:t>
+            </a:r>
+            <a:endParaRPr lang="en" altLang="zh-CN" b="0" dirty="0">
+              <a:solidFill>
+                <a:srgbClr val="000000"/>
+              </a:solidFill>
+              <a:effectLst/>
+              <a:latin typeface="Menlo" panose="020B0609030804020204" pitchFamily="49" charset="0"/>
+            </a:endParaRPr>
+          </a:p>
+          <a:p>
+            <a:r>
               <a:rPr lang="en" altLang="zh-CN" dirty="0">
                 <a:solidFill>
                   <a:srgbClr val="0000FF"/>
@@ -21159,7 +21302,7 @@
         </p:nvSpPr>
         <p:spPr>
           <a:xfrm>
-            <a:off x="0" y="1375126"/>
+            <a:off x="13780" y="1268325"/>
             <a:ext cx="1877437" cy="400110"/>
           </a:xfrm>
           <a:prstGeom prst="rect">
@@ -21177,9 +21320,6 @@
           <a:p>
             <a:r>
               <a:rPr lang="en" altLang="zh-CN" sz="2000" dirty="0" err="1">
-                <a:solidFill>
-                  <a:srgbClr val="0000CC"/>
-                </a:solidFill>
                 <a:highlight>
                   <a:srgbClr val="FFFF00"/>
                 </a:highlight>
@@ -21188,9 +21328,6 @@
               <a:t>student.hpp</a:t>
             </a:r>
             <a:endParaRPr lang="zh-CN" altLang="en-US" sz="2000" dirty="0">
-              <a:solidFill>
-                <a:srgbClr val="0000CC"/>
-              </a:solidFill>
               <a:highlight>
                 <a:srgbClr val="FFFF00"/>
               </a:highlight>
@@ -21212,7 +21349,7 @@
         </p:nvSpPr>
         <p:spPr>
           <a:xfrm>
-            <a:off x="8792289" y="1348175"/>
+            <a:off x="3524366" y="1270115"/>
             <a:ext cx="1877437" cy="400110"/>
           </a:xfrm>
           <a:prstGeom prst="rect">
@@ -21230,9 +21367,6 @@
           <a:p>
             <a:r>
               <a:rPr lang="en" altLang="zh-CN" sz="2000" dirty="0" err="1">
-                <a:solidFill>
-                  <a:srgbClr val="0000CC"/>
-                </a:solidFill>
                 <a:highlight>
                   <a:srgbClr val="FFFF00"/>
                 </a:highlight>
@@ -21241,9 +21375,584 @@
               <a:t>student.cpp</a:t>
             </a:r>
             <a:endParaRPr lang="zh-CN" altLang="en-US" sz="2000" dirty="0">
+              <a:highlight>
+                <a:srgbClr val="FFFF00"/>
+              </a:highlight>
+            </a:endParaRPr>
+          </a:p>
+        </p:txBody>
+      </p:sp>
+      <p:sp>
+        <p:nvSpPr>
+          <p:cNvPr id="8" name="矩形 7">
+            <a:extLst>
+              <a:ext uri="{FF2B5EF4-FFF2-40B4-BE49-F238E27FC236}">
+                <a16:creationId xmlns:a16="http://schemas.microsoft.com/office/drawing/2014/main" id="{3FB53BE6-AE98-948D-1AB0-8F7ACB6AFA83}"/>
+              </a:ext>
+            </a:extLst>
+          </p:cNvPr>
+          <p:cNvSpPr/>
+          <p:nvPr/>
+        </p:nvSpPr>
+        <p:spPr>
+          <a:xfrm>
+            <a:off x="6854105" y="5213893"/>
+            <a:ext cx="4182964" cy="2862322"/>
+          </a:xfrm>
+          <a:prstGeom prst="rect">
+            <a:avLst/>
+          </a:prstGeom>
+          <a:solidFill>
+            <a:schemeClr val="accent2">
+              <a:lumMod val="20000"/>
+              <a:lumOff val="80000"/>
+            </a:schemeClr>
+          </a:solidFill>
+        </p:spPr>
+        <p:txBody>
+          <a:bodyPr wrap="square">
+            <a:spAutoFit/>
+          </a:bodyPr>
+          <a:lstStyle/>
+          <a:p>
+            <a:r>
+              <a:rPr lang="en" altLang="zh-CN" b="0" dirty="0">
+                <a:solidFill>
+                  <a:srgbClr val="AF00DB"/>
+                </a:solidFill>
+                <a:effectLst/>
+                <a:latin typeface="Menlo" panose="020B0609030804020204" pitchFamily="49" charset="0"/>
+              </a:rPr>
+              <a:t>#include</a:t>
+            </a:r>
+            <a:r>
+              <a:rPr lang="en" altLang="zh-CN" b="0" dirty="0">
+                <a:solidFill>
+                  <a:srgbClr val="0000FF"/>
+                </a:solidFill>
+                <a:effectLst/>
+                <a:latin typeface="Menlo" panose="020B0609030804020204" pitchFamily="49" charset="0"/>
+              </a:rPr>
+              <a:t> </a:t>
+            </a:r>
+            <a:r>
+              <a:rPr lang="en" altLang="zh-CN" b="0" dirty="0">
+                <a:solidFill>
+                  <a:srgbClr val="A31515"/>
+                </a:solidFill>
+                <a:effectLst/>
+                <a:latin typeface="Menlo" panose="020B0609030804020204" pitchFamily="49" charset="0"/>
+              </a:rPr>
+              <a:t>"</a:t>
+            </a:r>
+            <a:r>
+              <a:rPr lang="en" altLang="zh-CN" b="0" dirty="0" err="1">
+                <a:solidFill>
+                  <a:srgbClr val="A31515"/>
+                </a:solidFill>
+                <a:effectLst/>
+                <a:latin typeface="Menlo" panose="020B0609030804020204" pitchFamily="49" charset="0"/>
+              </a:rPr>
+              <a:t>student.hpp</a:t>
+            </a:r>
+            <a:r>
+              <a:rPr lang="en" altLang="zh-CN" b="0" dirty="0">
+                <a:solidFill>
+                  <a:srgbClr val="A31515"/>
+                </a:solidFill>
+                <a:effectLst/>
+                <a:latin typeface="Menlo" panose="020B0609030804020204" pitchFamily="49" charset="0"/>
+              </a:rPr>
+              <a:t>"</a:t>
+            </a:r>
+            <a:endParaRPr lang="en" altLang="zh-CN" b="0" dirty="0">
               <a:solidFill>
-                <a:srgbClr val="0000CC"/>
+                <a:srgbClr val="000000"/>
               </a:solidFill>
+              <a:effectLst/>
+              <a:latin typeface="Menlo" panose="020B0609030804020204" pitchFamily="49" charset="0"/>
+            </a:endParaRPr>
+          </a:p>
+          <a:p>
+            <a:r>
+              <a:rPr lang="en" altLang="zh-CN" b="0" dirty="0">
+                <a:solidFill>
+                  <a:srgbClr val="0000FF"/>
+                </a:solidFill>
+                <a:effectLst/>
+                <a:latin typeface="Menlo" panose="020B0609030804020204" pitchFamily="49" charset="0"/>
+              </a:rPr>
+              <a:t>int</a:t>
+            </a:r>
+            <a:r>
+              <a:rPr lang="en" altLang="zh-CN" b="0" dirty="0">
+                <a:solidFill>
+                  <a:srgbClr val="000000"/>
+                </a:solidFill>
+                <a:effectLst/>
+                <a:latin typeface="Menlo" panose="020B0609030804020204" pitchFamily="49" charset="0"/>
+              </a:rPr>
+              <a:t> </a:t>
+            </a:r>
+            <a:r>
+              <a:rPr lang="en" altLang="zh-CN" b="0" dirty="0">
+                <a:solidFill>
+                  <a:srgbClr val="795E26"/>
+                </a:solidFill>
+                <a:effectLst/>
+                <a:latin typeface="Menlo" panose="020B0609030804020204" pitchFamily="49" charset="0"/>
+              </a:rPr>
+              <a:t>main</a:t>
+            </a:r>
+            <a:r>
+              <a:rPr lang="en" altLang="zh-CN" b="0" dirty="0">
+                <a:solidFill>
+                  <a:srgbClr val="000000"/>
+                </a:solidFill>
+                <a:effectLst/>
+                <a:latin typeface="Menlo" panose="020B0609030804020204" pitchFamily="49" charset="0"/>
+              </a:rPr>
+              <a:t>()</a:t>
+            </a:r>
+          </a:p>
+          <a:p>
+            <a:r>
+              <a:rPr lang="en" altLang="zh-CN" b="0" dirty="0">
+                <a:solidFill>
+                  <a:srgbClr val="000000"/>
+                </a:solidFill>
+                <a:effectLst/>
+                <a:latin typeface="Menlo" panose="020B0609030804020204" pitchFamily="49" charset="0"/>
+              </a:rPr>
+              <a:t>{</a:t>
+            </a:r>
+          </a:p>
+          <a:p>
+            <a:r>
+              <a:rPr lang="zh-CN" altLang="en-US" b="0" dirty="0">
+                <a:solidFill>
+                  <a:srgbClr val="267F99"/>
+                </a:solidFill>
+                <a:effectLst/>
+                <a:latin typeface="Menlo" panose="020B0609030804020204" pitchFamily="49" charset="0"/>
+              </a:rPr>
+              <a:t>    </a:t>
+            </a:r>
+            <a:r>
+              <a:rPr lang="en" altLang="zh-CN" b="0" dirty="0">
+                <a:solidFill>
+                  <a:srgbClr val="267F99"/>
+                </a:solidFill>
+                <a:effectLst/>
+                <a:latin typeface="Menlo" panose="020B0609030804020204" pitchFamily="49" charset="0"/>
+              </a:rPr>
+              <a:t>Student</a:t>
+            </a:r>
+            <a:r>
+              <a:rPr lang="en" altLang="zh-CN" b="0" dirty="0">
+                <a:solidFill>
+                  <a:srgbClr val="000000"/>
+                </a:solidFill>
+                <a:effectLst/>
+                <a:latin typeface="Menlo" panose="020B0609030804020204" pitchFamily="49" charset="0"/>
+              </a:rPr>
+              <a:t> </a:t>
+            </a:r>
+            <a:r>
+              <a:rPr lang="en" altLang="zh-CN" b="0" dirty="0" err="1">
+                <a:solidFill>
+                  <a:srgbClr val="001080"/>
+                </a:solidFill>
+                <a:effectLst/>
+                <a:latin typeface="Menlo" panose="020B0609030804020204" pitchFamily="49" charset="0"/>
+              </a:rPr>
+              <a:t>yu</a:t>
+            </a:r>
+            <a:r>
+              <a:rPr lang="en" altLang="zh-CN" b="0" dirty="0">
+                <a:solidFill>
+                  <a:srgbClr val="000000"/>
+                </a:solidFill>
+                <a:effectLst/>
+                <a:latin typeface="Menlo" panose="020B0609030804020204" pitchFamily="49" charset="0"/>
+              </a:rPr>
+              <a:t>;</a:t>
+            </a:r>
+          </a:p>
+          <a:p>
+            <a:r>
+              <a:rPr lang="zh-CN" altLang="en-US" b="0" dirty="0">
+                <a:solidFill>
+                  <a:srgbClr val="001080"/>
+                </a:solidFill>
+                <a:effectLst/>
+                <a:latin typeface="Menlo" panose="020B0609030804020204" pitchFamily="49" charset="0"/>
+              </a:rPr>
+              <a:t>    </a:t>
+            </a:r>
+            <a:r>
+              <a:rPr lang="en" altLang="zh-CN" b="0" dirty="0" err="1">
+                <a:solidFill>
+                  <a:srgbClr val="001080"/>
+                </a:solidFill>
+                <a:effectLst/>
+                <a:latin typeface="Menlo" panose="020B0609030804020204" pitchFamily="49" charset="0"/>
+              </a:rPr>
+              <a:t>yu</a:t>
+            </a:r>
+            <a:r>
+              <a:rPr lang="en" altLang="zh-CN" b="0" dirty="0" err="1">
+                <a:solidFill>
+                  <a:srgbClr val="000000"/>
+                </a:solidFill>
+                <a:effectLst/>
+                <a:latin typeface="Menlo" panose="020B0609030804020204" pitchFamily="49" charset="0"/>
+              </a:rPr>
+              <a:t>.</a:t>
+            </a:r>
+            <a:r>
+              <a:rPr lang="en" altLang="zh-CN" b="0" dirty="0" err="1">
+                <a:solidFill>
+                  <a:srgbClr val="795E26"/>
+                </a:solidFill>
+                <a:effectLst/>
+                <a:latin typeface="Menlo" panose="020B0609030804020204" pitchFamily="49" charset="0"/>
+              </a:rPr>
+              <a:t>setName</a:t>
+            </a:r>
+            <a:r>
+              <a:rPr lang="en" altLang="zh-CN" b="0" dirty="0">
+                <a:solidFill>
+                  <a:srgbClr val="000000"/>
+                </a:solidFill>
+                <a:effectLst/>
+                <a:latin typeface="Menlo" panose="020B0609030804020204" pitchFamily="49" charset="0"/>
+              </a:rPr>
+              <a:t>(</a:t>
+            </a:r>
+            <a:r>
+              <a:rPr lang="en" altLang="zh-CN" b="0" dirty="0">
+                <a:solidFill>
+                  <a:srgbClr val="A31515"/>
+                </a:solidFill>
+                <a:effectLst/>
+                <a:latin typeface="Menlo" panose="020B0609030804020204" pitchFamily="49" charset="0"/>
+              </a:rPr>
+              <a:t>"Yu"</a:t>
+            </a:r>
+            <a:r>
+              <a:rPr lang="en" altLang="zh-CN" b="0" dirty="0">
+                <a:solidFill>
+                  <a:srgbClr val="000000"/>
+                </a:solidFill>
+                <a:effectLst/>
+                <a:latin typeface="Menlo" panose="020B0609030804020204" pitchFamily="49" charset="0"/>
+              </a:rPr>
+              <a:t>);</a:t>
+            </a:r>
+          </a:p>
+          <a:p>
+            <a:r>
+              <a:rPr lang="zh-CN" altLang="en-US" b="0" dirty="0">
+                <a:solidFill>
+                  <a:srgbClr val="001080"/>
+                </a:solidFill>
+                <a:effectLst/>
+                <a:latin typeface="Menlo" panose="020B0609030804020204" pitchFamily="49" charset="0"/>
+              </a:rPr>
+              <a:t>    </a:t>
+            </a:r>
+            <a:r>
+              <a:rPr lang="en" altLang="zh-CN" b="0" dirty="0" err="1">
+                <a:solidFill>
+                  <a:srgbClr val="001080"/>
+                </a:solidFill>
+                <a:effectLst/>
+                <a:latin typeface="Menlo" panose="020B0609030804020204" pitchFamily="49" charset="0"/>
+              </a:rPr>
+              <a:t>yu</a:t>
+            </a:r>
+            <a:r>
+              <a:rPr lang="en" altLang="zh-CN" b="0" dirty="0" err="1">
+                <a:solidFill>
+                  <a:srgbClr val="000000"/>
+                </a:solidFill>
+                <a:effectLst/>
+                <a:latin typeface="Menlo" panose="020B0609030804020204" pitchFamily="49" charset="0"/>
+              </a:rPr>
+              <a:t>.</a:t>
+            </a:r>
+            <a:r>
+              <a:rPr lang="en" altLang="zh-CN" b="0" dirty="0" err="1">
+                <a:solidFill>
+                  <a:srgbClr val="795E26"/>
+                </a:solidFill>
+                <a:effectLst/>
+                <a:latin typeface="Menlo" panose="020B0609030804020204" pitchFamily="49" charset="0"/>
+              </a:rPr>
+              <a:t>setBorn</a:t>
+            </a:r>
+            <a:r>
+              <a:rPr lang="en" altLang="zh-CN" b="0" dirty="0">
+                <a:solidFill>
+                  <a:srgbClr val="000000"/>
+                </a:solidFill>
+                <a:effectLst/>
+                <a:latin typeface="Menlo" panose="020B0609030804020204" pitchFamily="49" charset="0"/>
+              </a:rPr>
+              <a:t>(</a:t>
+            </a:r>
+            <a:r>
+              <a:rPr lang="en" altLang="zh-CN" b="0" dirty="0">
+                <a:solidFill>
+                  <a:srgbClr val="098658"/>
+                </a:solidFill>
+                <a:effectLst/>
+                <a:latin typeface="Menlo" panose="020B0609030804020204" pitchFamily="49" charset="0"/>
+              </a:rPr>
+              <a:t>2000</a:t>
+            </a:r>
+            <a:r>
+              <a:rPr lang="en" altLang="zh-CN" b="0" dirty="0">
+                <a:solidFill>
+                  <a:srgbClr val="000000"/>
+                </a:solidFill>
+                <a:effectLst/>
+                <a:latin typeface="Menlo" panose="020B0609030804020204" pitchFamily="49" charset="0"/>
+              </a:rPr>
+              <a:t>);</a:t>
+            </a:r>
+          </a:p>
+          <a:p>
+            <a:r>
+              <a:rPr lang="zh-CN" altLang="en-US" b="0" dirty="0">
+                <a:solidFill>
+                  <a:srgbClr val="001080"/>
+                </a:solidFill>
+                <a:effectLst/>
+                <a:latin typeface="Menlo" panose="020B0609030804020204" pitchFamily="49" charset="0"/>
+              </a:rPr>
+              <a:t>    </a:t>
+            </a:r>
+            <a:r>
+              <a:rPr lang="en" altLang="zh-CN" b="0" dirty="0" err="1">
+                <a:solidFill>
+                  <a:srgbClr val="001080"/>
+                </a:solidFill>
+                <a:effectLst/>
+                <a:latin typeface="Menlo" panose="020B0609030804020204" pitchFamily="49" charset="0"/>
+              </a:rPr>
+              <a:t>yu</a:t>
+            </a:r>
+            <a:r>
+              <a:rPr lang="en" altLang="zh-CN" b="0" dirty="0" err="1">
+                <a:solidFill>
+                  <a:srgbClr val="000000"/>
+                </a:solidFill>
+                <a:effectLst/>
+                <a:latin typeface="Menlo" panose="020B0609030804020204" pitchFamily="49" charset="0"/>
+              </a:rPr>
+              <a:t>.</a:t>
+            </a:r>
+            <a:r>
+              <a:rPr lang="en" altLang="zh-CN" b="0" dirty="0" err="1">
+                <a:solidFill>
+                  <a:srgbClr val="795E26"/>
+                </a:solidFill>
+                <a:effectLst/>
+                <a:latin typeface="Menlo" panose="020B0609030804020204" pitchFamily="49" charset="0"/>
+              </a:rPr>
+              <a:t>setGender</a:t>
+            </a:r>
+            <a:r>
+              <a:rPr lang="en" altLang="zh-CN" b="0" dirty="0">
+                <a:solidFill>
+                  <a:srgbClr val="000000"/>
+                </a:solidFill>
+                <a:effectLst/>
+                <a:latin typeface="Menlo" panose="020B0609030804020204" pitchFamily="49" charset="0"/>
+              </a:rPr>
+              <a:t>(</a:t>
+            </a:r>
+            <a:r>
+              <a:rPr lang="en" altLang="zh-CN" b="0" dirty="0">
+                <a:solidFill>
+                  <a:srgbClr val="0000FF"/>
+                </a:solidFill>
+                <a:effectLst/>
+                <a:latin typeface="Menlo" panose="020B0609030804020204" pitchFamily="49" charset="0"/>
+              </a:rPr>
+              <a:t>true</a:t>
+            </a:r>
+            <a:r>
+              <a:rPr lang="en" altLang="zh-CN" b="0" dirty="0">
+                <a:solidFill>
+                  <a:srgbClr val="000000"/>
+                </a:solidFill>
+                <a:effectLst/>
+                <a:latin typeface="Menlo" panose="020B0609030804020204" pitchFamily="49" charset="0"/>
+              </a:rPr>
+              <a:t>);</a:t>
+            </a:r>
+          </a:p>
+          <a:p>
+            <a:r>
+              <a:rPr lang="zh-CN" altLang="en-US" b="0" dirty="0">
+                <a:solidFill>
+                  <a:srgbClr val="001080"/>
+                </a:solidFill>
+                <a:effectLst/>
+                <a:latin typeface="Menlo" panose="020B0609030804020204" pitchFamily="49" charset="0"/>
+              </a:rPr>
+              <a:t>    </a:t>
+            </a:r>
+            <a:r>
+              <a:rPr lang="en" altLang="zh-CN" b="0" dirty="0" err="1">
+                <a:solidFill>
+                  <a:srgbClr val="001080"/>
+                </a:solidFill>
+                <a:effectLst/>
+                <a:latin typeface="Menlo" panose="020B0609030804020204" pitchFamily="49" charset="0"/>
+              </a:rPr>
+              <a:t>yu</a:t>
+            </a:r>
+            <a:r>
+              <a:rPr lang="en" altLang="zh-CN" b="0" dirty="0" err="1">
+                <a:solidFill>
+                  <a:srgbClr val="000000"/>
+                </a:solidFill>
+                <a:effectLst/>
+                <a:latin typeface="Menlo" panose="020B0609030804020204" pitchFamily="49" charset="0"/>
+              </a:rPr>
+              <a:t>.</a:t>
+            </a:r>
+            <a:r>
+              <a:rPr lang="en" altLang="zh-CN" b="0" dirty="0" err="1">
+                <a:solidFill>
+                  <a:srgbClr val="795E26"/>
+                </a:solidFill>
+                <a:effectLst/>
+                <a:latin typeface="Menlo" panose="020B0609030804020204" pitchFamily="49" charset="0"/>
+              </a:rPr>
+              <a:t>printInfo</a:t>
+            </a:r>
+            <a:r>
+              <a:rPr lang="en" altLang="zh-CN" b="0" dirty="0">
+                <a:solidFill>
+                  <a:srgbClr val="000000"/>
+                </a:solidFill>
+                <a:effectLst/>
+                <a:latin typeface="Menlo" panose="020B0609030804020204" pitchFamily="49" charset="0"/>
+              </a:rPr>
+              <a:t>();</a:t>
+            </a:r>
+          </a:p>
+          <a:p>
+            <a:r>
+              <a:rPr lang="zh-CN" altLang="en-US" b="0" dirty="0">
+                <a:solidFill>
+                  <a:srgbClr val="AF00DB"/>
+                </a:solidFill>
+                <a:effectLst/>
+                <a:latin typeface="Menlo" panose="020B0609030804020204" pitchFamily="49" charset="0"/>
+              </a:rPr>
+              <a:t>    </a:t>
+            </a:r>
+            <a:r>
+              <a:rPr lang="en" altLang="zh-CN" b="0" dirty="0">
+                <a:solidFill>
+                  <a:srgbClr val="AF00DB"/>
+                </a:solidFill>
+                <a:effectLst/>
+                <a:latin typeface="Menlo" panose="020B0609030804020204" pitchFamily="49" charset="0"/>
+              </a:rPr>
+              <a:t>return</a:t>
+            </a:r>
+            <a:r>
+              <a:rPr lang="en" altLang="zh-CN" b="0" dirty="0">
+                <a:solidFill>
+                  <a:srgbClr val="000000"/>
+                </a:solidFill>
+                <a:effectLst/>
+                <a:latin typeface="Menlo" panose="020B0609030804020204" pitchFamily="49" charset="0"/>
+              </a:rPr>
+              <a:t> </a:t>
+            </a:r>
+            <a:r>
+              <a:rPr lang="en" altLang="zh-CN" b="0" dirty="0">
+                <a:solidFill>
+                  <a:srgbClr val="098658"/>
+                </a:solidFill>
+                <a:effectLst/>
+                <a:latin typeface="Menlo" panose="020B0609030804020204" pitchFamily="49" charset="0"/>
+              </a:rPr>
+              <a:t>0</a:t>
+            </a:r>
+            <a:r>
+              <a:rPr lang="en" altLang="zh-CN" b="0" dirty="0">
+                <a:solidFill>
+                  <a:srgbClr val="000000"/>
+                </a:solidFill>
+                <a:effectLst/>
+                <a:latin typeface="Menlo" panose="020B0609030804020204" pitchFamily="49" charset="0"/>
+              </a:rPr>
+              <a:t>;</a:t>
+            </a:r>
+          </a:p>
+          <a:p>
+            <a:r>
+              <a:rPr lang="en" altLang="zh-CN" b="0" dirty="0">
+                <a:solidFill>
+                  <a:srgbClr val="000000"/>
+                </a:solidFill>
+                <a:effectLst/>
+                <a:latin typeface="Menlo" panose="020B0609030804020204" pitchFamily="49" charset="0"/>
+              </a:rPr>
+              <a:t>}</a:t>
+            </a:r>
+          </a:p>
+        </p:txBody>
+      </p:sp>
+      <p:sp>
+        <p:nvSpPr>
+          <p:cNvPr id="9" name="矩形 8">
+            <a:extLst>
+              <a:ext uri="{FF2B5EF4-FFF2-40B4-BE49-F238E27FC236}">
+                <a16:creationId xmlns:a16="http://schemas.microsoft.com/office/drawing/2014/main" id="{4C154636-87F8-AB24-E12C-DDE2CA10BB75}"/>
+              </a:ext>
+            </a:extLst>
+          </p:cNvPr>
+          <p:cNvSpPr/>
+          <p:nvPr/>
+        </p:nvSpPr>
+        <p:spPr>
+          <a:xfrm>
+            <a:off x="6821122" y="4787665"/>
+            <a:ext cx="1415772" cy="400110"/>
+          </a:xfrm>
+          <a:prstGeom prst="rect">
+            <a:avLst/>
+          </a:prstGeom>
+          <a:solidFill>
+            <a:schemeClr val="bg1"/>
+          </a:solidFill>
+        </p:spPr>
+        <p:txBody>
+          <a:bodyPr wrap="none">
+            <a:spAutoFit/>
+          </a:bodyPr>
+          <a:lstStyle/>
+          <a:p>
+            <a:r>
+              <a:rPr lang="en" altLang="zh-CN" sz="2000" dirty="0" err="1">
+                <a:highlight>
+                  <a:srgbClr val="FFFF00"/>
+                </a:highlight>
+                <a:latin typeface="Menlo" panose="020B0609030804020204" pitchFamily="49" charset="0"/>
+              </a:rPr>
+              <a:t>main.cpp</a:t>
+            </a:r>
+            <a:endParaRPr lang="zh-CN" altLang="en-US" sz="2000" dirty="0">
               <a:highlight>
                 <a:srgbClr val="FFFF00"/>
               </a:highlight>
@@ -21359,6 +22068,51 @@
                       </p:childTnLst>
                     </p:cTn>
                   </p:par>
+                  <p:par>
+                    <p:cTn id="11" fill="hold">
+                      <p:stCondLst>
+                        <p:cond delay="indefinite"/>
+                      </p:stCondLst>
+                      <p:childTnLst>
+                        <p:par>
+                          <p:cTn id="12" fill="hold">
+                            <p:stCondLst>
+                              <p:cond delay="0"/>
+                            </p:stCondLst>
+                            <p:childTnLst>
+                              <p:par>
+                                <p:cTn id="13" presetID="1" presetClass="entr" presetSubtype="0" fill="hold" grpId="0" nodeType="clickEffect">
+                                  <p:stCondLst>
+                                    <p:cond delay="0"/>
+                                  </p:stCondLst>
+                                  <p:childTnLst>
+                                    <p:set>
+                                      <p:cBhvr>
+                                        <p:cTn id="14" dur="1" fill="hold">
+                                          <p:stCondLst>
+                                            <p:cond delay="0"/>
+                                          </p:stCondLst>
+                                        </p:cTn>
+                                        <p:tgtEl>
+                                          <p:spTgt spid="9"/>
+                                        </p:tgtEl>
+                                        <p:attrNameLst>
+                                          <p:attrName>style.visibility</p:attrName>
+                                        </p:attrNameLst>
+                                      </p:cBhvr>
+                                      <p:to>
+                                        <p:strVal val="visible"/>
+                                      </p:to>
+                                    </p:set>
+                                  </p:childTnLst>
+                                </p:cTn>
+                              </p:par>
+                            </p:childTnLst>
+                          </p:cTn>
+                        </p:par>
+                      </p:childTnLst>
+                    </p:cTn>
+                  </p:par>
                 </p:childTnLst>
               </p:cTn>
               <p:prevCondLst>
@@ -21383,6 +22137,7 @@
     <p:bldLst>
       <p:bldP spid="6" grpId="0" animBg="1"/>
       <p:bldP spid="7" grpId="0" animBg="1"/>
+      <p:bldP spid="9" grpId="0" animBg="1"/>
     </p:bldLst>
   </p:timing>
 </p:sld>

</xml_diff>